<commit_message>
partial fixes to concepts and landing page
Signed-off-by: Srinivasan Parthasarathy <spartha@us.ibm.com>
</commit_message>
<xml_diff>
--- a/mkdocs/docs/images/src/what-is-iter8.pptx
+++ b/mkdocs/docs/images/src/what-is-iter8.pptx
@@ -197,7 +197,7 @@
           <a:p>
             <a:fld id="{38B78CBE-37FA-D241-BB4C-CAC5D3B25F49}" type="datetimeFigureOut">
               <a:rPr lang="en-US" smtClean="0"/>
-              <a:t>6/21/21</a:t>
+              <a:t>10/14/21</a:t>
             </a:fld>
             <a:endParaRPr lang="en-US"/>
           </a:p>
@@ -611,7 +611,7 @@
           <a:p>
             <a:fld id="{708812C5-0212-FD42-A0D4-E2E8FF4E3AF5}" type="datetime1">
               <a:rPr lang="en-US" smtClean="0"/>
-              <a:t>6/21/21</a:t>
+              <a:t>10/14/21</a:t>
             </a:fld>
             <a:endParaRPr lang="en-US"/>
           </a:p>
@@ -812,7 +812,7 @@
           <a:p>
             <a:fld id="{D232AC6F-41C3-B34B-9BAA-03ED2F3BC0F6}" type="datetime1">
               <a:rPr lang="en-US" smtClean="0"/>
-              <a:t>6/21/21</a:t>
+              <a:t>10/14/21</a:t>
             </a:fld>
             <a:endParaRPr lang="en-US"/>
           </a:p>
@@ -1023,7 +1023,7 @@
           <a:p>
             <a:fld id="{BEE140C2-F440-9D49-95CB-5965D64CC4A2}" type="datetime1">
               <a:rPr lang="en-US" smtClean="0"/>
-              <a:t>6/21/21</a:t>
+              <a:t>10/14/21</a:t>
             </a:fld>
             <a:endParaRPr lang="en-US"/>
           </a:p>
@@ -1224,7 +1224,7 @@
           <a:p>
             <a:fld id="{CC99F980-FB29-FD47-8508-150F73F1E8B0}" type="datetime1">
               <a:rPr lang="en-US" smtClean="0"/>
-              <a:t>6/21/21</a:t>
+              <a:t>10/14/21</a:t>
             </a:fld>
             <a:endParaRPr lang="en-US"/>
           </a:p>
@@ -1502,7 +1502,7 @@
           <a:p>
             <a:fld id="{D4510983-EA22-9643-8AC0-B3C6499B643B}" type="datetime1">
               <a:rPr lang="en-US" smtClean="0"/>
-              <a:t>6/21/21</a:t>
+              <a:t>10/14/21</a:t>
             </a:fld>
             <a:endParaRPr lang="en-US"/>
           </a:p>
@@ -1770,7 +1770,7 @@
           <a:p>
             <a:fld id="{D5A39195-967D-5D4E-8C6A-C99866996458}" type="datetime1">
               <a:rPr lang="en-US" smtClean="0"/>
-              <a:t>6/21/21</a:t>
+              <a:t>10/14/21</a:t>
             </a:fld>
             <a:endParaRPr lang="en-US"/>
           </a:p>
@@ -2185,7 +2185,7 @@
           <a:p>
             <a:fld id="{5AD771E9-C79D-684D-A158-5EB6E92DE947}" type="datetime1">
               <a:rPr lang="en-US" smtClean="0"/>
-              <a:t>6/21/21</a:t>
+              <a:t>10/14/21</a:t>
             </a:fld>
             <a:endParaRPr lang="en-US"/>
           </a:p>
@@ -2329,7 +2329,7 @@
           <a:p>
             <a:fld id="{693CA161-7E4C-5C4B-B799-DB602A0B9806}" type="datetime1">
               <a:rPr lang="en-US" smtClean="0"/>
-              <a:t>6/21/21</a:t>
+              <a:t>10/14/21</a:t>
             </a:fld>
             <a:endParaRPr lang="en-US"/>
           </a:p>
@@ -2445,7 +2445,7 @@
           <a:p>
             <a:fld id="{6D55FDF3-8BB2-6349-A5FA-057F3D78953D}" type="datetime1">
               <a:rPr lang="en-US" smtClean="0"/>
-              <a:t>6/21/21</a:t>
+              <a:t>10/14/21</a:t>
             </a:fld>
             <a:endParaRPr lang="en-US"/>
           </a:p>
@@ -2759,7 +2759,7 @@
           <a:p>
             <a:fld id="{EEDFACC0-3228-BA4B-942E-CEF38B0101FD}" type="datetime1">
               <a:rPr lang="en-US" smtClean="0"/>
-              <a:t>6/21/21</a:t>
+              <a:t>10/14/21</a:t>
             </a:fld>
             <a:endParaRPr lang="en-US"/>
           </a:p>
@@ -3050,7 +3050,7 @@
           <a:p>
             <a:fld id="{07EEEDBE-E24C-D140-B419-6D8D592D0F1C}" type="datetime1">
               <a:rPr lang="en-US" smtClean="0"/>
-              <a:t>6/21/21</a:t>
+              <a:t>10/14/21</a:t>
             </a:fld>
             <a:endParaRPr lang="en-US"/>
           </a:p>
@@ -3294,7 +3294,7 @@
           <a:p>
             <a:fld id="{E05781A2-A5EF-C54C-A3EF-F62483D37EDC}" type="datetime1">
               <a:rPr lang="en-US" smtClean="0"/>
-              <a:t>6/21/21</a:t>
+              <a:t>10/14/21</a:t>
             </a:fld>
             <a:endParaRPr lang="en-US"/>
           </a:p>
@@ -3729,8 +3729,8 @@
         </p:nvSpPr>
         <p:spPr>
           <a:xfrm>
-            <a:off x="2104707" y="809298"/>
-            <a:ext cx="8111347" cy="3867806"/>
+            <a:off x="2104707" y="809297"/>
+            <a:ext cx="8111347" cy="4225157"/>
           </a:xfrm>
           <a:prstGeom prst="rect">
             <a:avLst/>
@@ -4228,8 +4228,8 @@
         </p:nvSpPr>
         <p:spPr>
           <a:xfrm>
-            <a:off x="7603241" y="2595422"/>
-            <a:ext cx="1871948" cy="642601"/>
+            <a:off x="7472855" y="2595422"/>
+            <a:ext cx="2002334" cy="642601"/>
           </a:xfrm>
           <a:prstGeom prst="rect">
             <a:avLst/>
@@ -4272,7 +4272,7 @@
                   <a:schemeClr val="tx1"/>
                 </a:solidFill>
               </a:rPr>
-              <a:t>Assess versions</a:t>
+              <a:t>Assess versions. Find winning version.</a:t>
             </a:r>
           </a:p>
         </p:txBody>
@@ -4543,7 +4543,7 @@
                   <a:schemeClr val="tx1"/>
                 </a:solidFill>
               </a:rPr>
-              <a:t>Promote winning version</a:t>
+              <a:t>Promote winner</a:t>
             </a:r>
           </a:p>
         </p:txBody>
@@ -4795,7 +4795,7 @@
         <p:spPr>
           <a:xfrm rot="10800000">
             <a:off x="5519183" y="2550967"/>
-            <a:ext cx="2084059" cy="365757"/>
+            <a:ext cx="1953673" cy="365757"/>
           </a:xfrm>
           <a:prstGeom prst="bentConnector2">
             <a:avLst/>
@@ -5160,7 +5160,7 @@
                   <a:schemeClr val="tx1"/>
                 </a:solidFill>
               </a:rPr>
-              <a:t>Deploy new version of application</a:t>
+              <a:t>Deploy new app version</a:t>
             </a:r>
           </a:p>
         </p:txBody>
@@ -5183,8 +5183,8 @@
         </p:nvCxnSpPr>
         <p:spPr>
           <a:xfrm rot="16200000" flipH="1">
-            <a:off x="7920967" y="1977174"/>
-            <a:ext cx="661756" cy="574739"/>
+            <a:off x="7888371" y="2009771"/>
+            <a:ext cx="661756" cy="509546"/>
           </a:xfrm>
           <a:prstGeom prst="bentConnector3">
             <a:avLst>

</xml_diff>